<commit_message>
Update About pic to cusparse
And remove cusp reference
</commit_message>
<xml_diff>
--- a/images/FeltorStructure.pptx
+++ b/images/FeltorStructure.pptx
@@ -123,6 +123,283 @@
 </p:presentation>
 </file>
 
+<file path=ppt/revisionInfo.xml><?xml version="1.0" encoding="utf-8"?>
+<p1510:revInfo xmlns:a="http://schemas.openxmlformats.org/drawingml/2006/main" xmlns:r="http://schemas.openxmlformats.org/officeDocument/2006/relationships" xmlns:p1510="http://schemas.microsoft.com/office/powerpoint/2015/10/main">
+  <p1510:revLst>
+    <p1510:client id="{6C93FBF6-401F-430E-8C80-3465665F24FE}" v="4" dt="2025-03-25T14:36:38.785"/>
+  </p1510:revLst>
+</p1510:revInfo>
+</file>
+
+<file path=ppt/changesInfos/changesInfo1.xml><?xml version="1.0" encoding="utf-8"?>
+<pc:chgInfo xmlns:a="http://schemas.openxmlformats.org/drawingml/2006/main" xmlns:r="http://schemas.openxmlformats.org/officeDocument/2006/relationships" xmlns:ac="http://schemas.microsoft.com/office/drawing/2013/main/command" xmlns:pc="http://schemas.microsoft.com/office/powerpoint/2013/main/command">
+  <pc:docChgLst>
+    <pc:chgData name="Matthias Wiesenberger" userId="f1b754cb-c359-4b41-b165-8c08cbd0ddb4" providerId="ADAL" clId="{6C93FBF6-401F-430E-8C80-3465665F24FE}"/>
+    <pc:docChg chg="undo redo custSel modSld">
+      <pc:chgData name="Matthias Wiesenberger" userId="f1b754cb-c359-4b41-b165-8c08cbd0ddb4" providerId="ADAL" clId="{6C93FBF6-401F-430E-8C80-3465665F24FE}" dt="2025-03-25T14:36:54.329" v="24" actId="20577"/>
+      <pc:docMkLst>
+        <pc:docMk/>
+      </pc:docMkLst>
+      <pc:sldChg chg="addSp delSp modSp mod">
+        <pc:chgData name="Matthias Wiesenberger" userId="f1b754cb-c359-4b41-b165-8c08cbd0ddb4" providerId="ADAL" clId="{6C93FBF6-401F-430E-8C80-3465665F24FE}" dt="2025-03-25T14:36:54.329" v="24" actId="20577"/>
+        <pc:sldMkLst>
+          <pc:docMk/>
+          <pc:sldMk cId="3760719299" sldId="257"/>
+        </pc:sldMkLst>
+        <pc:spChg chg="add del">
+          <ac:chgData name="Matthias Wiesenberger" userId="f1b754cb-c359-4b41-b165-8c08cbd0ddb4" providerId="ADAL" clId="{6C93FBF6-401F-430E-8C80-3465665F24FE}" dt="2025-03-25T14:36:38.555" v="11" actId="21"/>
+          <ac:spMkLst>
+            <pc:docMk/>
+            <pc:sldMk cId="3760719299" sldId="257"/>
+            <ac:spMk id="3" creationId="{00000000-0000-0000-0000-000000000000}"/>
+          </ac:spMkLst>
+        </pc:spChg>
+        <pc:spChg chg="add del">
+          <ac:chgData name="Matthias Wiesenberger" userId="f1b754cb-c359-4b41-b165-8c08cbd0ddb4" providerId="ADAL" clId="{6C93FBF6-401F-430E-8C80-3465665F24FE}" dt="2025-03-25T14:36:38.555" v="11" actId="21"/>
+          <ac:spMkLst>
+            <pc:docMk/>
+            <pc:sldMk cId="3760719299" sldId="257"/>
+            <ac:spMk id="6" creationId="{00000000-0000-0000-0000-000000000000}"/>
+          </ac:spMkLst>
+        </pc:spChg>
+        <pc:spChg chg="add del">
+          <ac:chgData name="Matthias Wiesenberger" userId="f1b754cb-c359-4b41-b165-8c08cbd0ddb4" providerId="ADAL" clId="{6C93FBF6-401F-430E-8C80-3465665F24FE}" dt="2025-03-25T14:36:38.961" v="12" actId="21"/>
+          <ac:spMkLst>
+            <pc:docMk/>
+            <pc:sldMk cId="3760719299" sldId="257"/>
+            <ac:spMk id="8" creationId="{00000000-0000-0000-0000-000000000000}"/>
+          </ac:spMkLst>
+        </pc:spChg>
+        <pc:spChg chg="add del">
+          <ac:chgData name="Matthias Wiesenberger" userId="f1b754cb-c359-4b41-b165-8c08cbd0ddb4" providerId="ADAL" clId="{6C93FBF6-401F-430E-8C80-3465665F24FE}" dt="2025-03-25T14:36:38.555" v="11" actId="21"/>
+          <ac:spMkLst>
+            <pc:docMk/>
+            <pc:sldMk cId="3760719299" sldId="257"/>
+            <ac:spMk id="19" creationId="{00000000-0000-0000-0000-000000000000}"/>
+          </ac:spMkLst>
+        </pc:spChg>
+        <pc:spChg chg="add del mod">
+          <ac:chgData name="Matthias Wiesenberger" userId="f1b754cb-c359-4b41-b165-8c08cbd0ddb4" providerId="ADAL" clId="{6C93FBF6-401F-430E-8C80-3465665F24FE}" dt="2025-03-25T14:36:54.329" v="24" actId="20577"/>
+          <ac:spMkLst>
+            <pc:docMk/>
+            <pc:sldMk cId="3760719299" sldId="257"/>
+            <ac:spMk id="26" creationId="{00000000-0000-0000-0000-000000000000}"/>
+          </ac:spMkLst>
+        </pc:spChg>
+        <pc:spChg chg="add del">
+          <ac:chgData name="Matthias Wiesenberger" userId="f1b754cb-c359-4b41-b165-8c08cbd0ddb4" providerId="ADAL" clId="{6C93FBF6-401F-430E-8C80-3465665F24FE}" dt="2025-03-25T14:36:38.555" v="11" actId="21"/>
+          <ac:spMkLst>
+            <pc:docMk/>
+            <pc:sldMk cId="3760719299" sldId="257"/>
+            <ac:spMk id="28" creationId="{00000000-0000-0000-0000-000000000000}"/>
+          </ac:spMkLst>
+        </pc:spChg>
+        <pc:spChg chg="add del">
+          <ac:chgData name="Matthias Wiesenberger" userId="f1b754cb-c359-4b41-b165-8c08cbd0ddb4" providerId="ADAL" clId="{6C93FBF6-401F-430E-8C80-3465665F24FE}" dt="2025-03-25T14:36:38.961" v="12" actId="21"/>
+          <ac:spMkLst>
+            <pc:docMk/>
+            <pc:sldMk cId="3760719299" sldId="257"/>
+            <ac:spMk id="51" creationId="{00000000-0000-0000-0000-000000000000}"/>
+          </ac:spMkLst>
+        </pc:spChg>
+        <pc:spChg chg="add del">
+          <ac:chgData name="Matthias Wiesenberger" userId="f1b754cb-c359-4b41-b165-8c08cbd0ddb4" providerId="ADAL" clId="{6C93FBF6-401F-430E-8C80-3465665F24FE}" dt="2025-03-25T14:36:38.961" v="12" actId="21"/>
+          <ac:spMkLst>
+            <pc:docMk/>
+            <pc:sldMk cId="3760719299" sldId="257"/>
+            <ac:spMk id="52" creationId="{00000000-0000-0000-0000-000000000000}"/>
+          </ac:spMkLst>
+        </pc:spChg>
+        <pc:spChg chg="add del">
+          <ac:chgData name="Matthias Wiesenberger" userId="f1b754cb-c359-4b41-b165-8c08cbd0ddb4" providerId="ADAL" clId="{6C93FBF6-401F-430E-8C80-3465665F24FE}" dt="2025-03-25T14:36:38.961" v="12" actId="21"/>
+          <ac:spMkLst>
+            <pc:docMk/>
+            <pc:sldMk cId="3760719299" sldId="257"/>
+            <ac:spMk id="53" creationId="{00000000-0000-0000-0000-000000000000}"/>
+          </ac:spMkLst>
+        </pc:spChg>
+        <pc:spChg chg="add del">
+          <ac:chgData name="Matthias Wiesenberger" userId="f1b754cb-c359-4b41-b165-8c08cbd0ddb4" providerId="ADAL" clId="{6C93FBF6-401F-430E-8C80-3465665F24FE}" dt="2025-03-25T14:36:38.961" v="12" actId="21"/>
+          <ac:spMkLst>
+            <pc:docMk/>
+            <pc:sldMk cId="3760719299" sldId="257"/>
+            <ac:spMk id="54" creationId="{00000000-0000-0000-0000-000000000000}"/>
+          </ac:spMkLst>
+        </pc:spChg>
+        <pc:spChg chg="add del">
+          <ac:chgData name="Matthias Wiesenberger" userId="f1b754cb-c359-4b41-b165-8c08cbd0ddb4" providerId="ADAL" clId="{6C93FBF6-401F-430E-8C80-3465665F24FE}" dt="2025-03-25T14:36:38.961" v="12" actId="21"/>
+          <ac:spMkLst>
+            <pc:docMk/>
+            <pc:sldMk cId="3760719299" sldId="257"/>
+            <ac:spMk id="55" creationId="{00000000-0000-0000-0000-000000000000}"/>
+          </ac:spMkLst>
+        </pc:spChg>
+        <pc:spChg chg="add del">
+          <ac:chgData name="Matthias Wiesenberger" userId="f1b754cb-c359-4b41-b165-8c08cbd0ddb4" providerId="ADAL" clId="{6C93FBF6-401F-430E-8C80-3465665F24FE}" dt="2025-03-25T14:36:38.961" v="12" actId="21"/>
+          <ac:spMkLst>
+            <pc:docMk/>
+            <pc:sldMk cId="3760719299" sldId="257"/>
+            <ac:spMk id="58" creationId="{00000000-0000-0000-0000-000000000000}"/>
+          </ac:spMkLst>
+        </pc:spChg>
+        <pc:spChg chg="add del">
+          <ac:chgData name="Matthias Wiesenberger" userId="f1b754cb-c359-4b41-b165-8c08cbd0ddb4" providerId="ADAL" clId="{6C93FBF6-401F-430E-8C80-3465665F24FE}" dt="2025-03-25T14:36:38.961" v="12" actId="21"/>
+          <ac:spMkLst>
+            <pc:docMk/>
+            <pc:sldMk cId="3760719299" sldId="257"/>
+            <ac:spMk id="62" creationId="{00000000-0000-0000-0000-000000000000}"/>
+          </ac:spMkLst>
+        </pc:spChg>
+        <pc:spChg chg="add del">
+          <ac:chgData name="Matthias Wiesenberger" userId="f1b754cb-c359-4b41-b165-8c08cbd0ddb4" providerId="ADAL" clId="{6C93FBF6-401F-430E-8C80-3465665F24FE}" dt="2025-03-25T14:36:38.555" v="11" actId="21"/>
+          <ac:spMkLst>
+            <pc:docMk/>
+            <pc:sldMk cId="3760719299" sldId="257"/>
+            <ac:spMk id="63" creationId="{00000000-0000-0000-0000-000000000000}"/>
+          </ac:spMkLst>
+        </pc:spChg>
+        <pc:spChg chg="add del">
+          <ac:chgData name="Matthias Wiesenberger" userId="f1b754cb-c359-4b41-b165-8c08cbd0ddb4" providerId="ADAL" clId="{6C93FBF6-401F-430E-8C80-3465665F24FE}" dt="2025-03-25T14:36:38.555" v="11" actId="21"/>
+          <ac:spMkLst>
+            <pc:docMk/>
+            <pc:sldMk cId="3760719299" sldId="257"/>
+            <ac:spMk id="70" creationId="{00000000-0000-0000-0000-000000000000}"/>
+          </ac:spMkLst>
+        </pc:spChg>
+        <pc:spChg chg="add del">
+          <ac:chgData name="Matthias Wiesenberger" userId="f1b754cb-c359-4b41-b165-8c08cbd0ddb4" providerId="ADAL" clId="{6C93FBF6-401F-430E-8C80-3465665F24FE}" dt="2025-03-25T14:36:38.555" v="11" actId="21"/>
+          <ac:spMkLst>
+            <pc:docMk/>
+            <pc:sldMk cId="3760719299" sldId="257"/>
+            <ac:spMk id="72" creationId="{00000000-0000-0000-0000-000000000000}"/>
+          </ac:spMkLst>
+        </pc:spChg>
+        <pc:spChg chg="add del">
+          <ac:chgData name="Matthias Wiesenberger" userId="f1b754cb-c359-4b41-b165-8c08cbd0ddb4" providerId="ADAL" clId="{6C93FBF6-401F-430E-8C80-3465665F24FE}" dt="2025-03-25T14:36:38.555" v="11" actId="21"/>
+          <ac:spMkLst>
+            <pc:docMk/>
+            <pc:sldMk cId="3760719299" sldId="257"/>
+            <ac:spMk id="75" creationId="{00000000-0000-0000-0000-000000000000}"/>
+          </ac:spMkLst>
+        </pc:spChg>
+        <pc:spChg chg="add mod">
+          <ac:chgData name="Matthias Wiesenberger" userId="f1b754cb-c359-4b41-b165-8c08cbd0ddb4" providerId="ADAL" clId="{6C93FBF6-401F-430E-8C80-3465665F24FE}" dt="2025-03-25T14:35:40.354" v="9"/>
+          <ac:spMkLst>
+            <pc:docMk/>
+            <pc:sldMk cId="3760719299" sldId="257"/>
+            <ac:spMk id="76" creationId="{00000000-0000-0000-0000-000000000000}"/>
+          </ac:spMkLst>
+        </pc:spChg>
+        <pc:spChg chg="add del">
+          <ac:chgData name="Matthias Wiesenberger" userId="f1b754cb-c359-4b41-b165-8c08cbd0ddb4" providerId="ADAL" clId="{6C93FBF6-401F-430E-8C80-3465665F24FE}" dt="2025-03-25T14:36:38.961" v="12" actId="21"/>
+          <ac:spMkLst>
+            <pc:docMk/>
+            <pc:sldMk cId="3760719299" sldId="257"/>
+            <ac:spMk id="106" creationId="{00000000-0000-0000-0000-000000000000}"/>
+          </ac:spMkLst>
+        </pc:spChg>
+        <pc:spChg chg="add del">
+          <ac:chgData name="Matthias Wiesenberger" userId="f1b754cb-c359-4b41-b165-8c08cbd0ddb4" providerId="ADAL" clId="{6C93FBF6-401F-430E-8C80-3465665F24FE}" dt="2025-03-25T14:36:38.555" v="11" actId="21"/>
+          <ac:spMkLst>
+            <pc:docMk/>
+            <pc:sldMk cId="3760719299" sldId="257"/>
+            <ac:spMk id="107" creationId="{00000000-0000-0000-0000-000000000000}"/>
+          </ac:spMkLst>
+        </pc:spChg>
+        <pc:spChg chg="mod">
+          <ac:chgData name="Matthias Wiesenberger" userId="f1b754cb-c359-4b41-b165-8c08cbd0ddb4" providerId="ADAL" clId="{6C93FBF6-401F-430E-8C80-3465665F24FE}" dt="2025-03-25T14:35:40.354" v="9"/>
+          <ac:spMkLst>
+            <pc:docMk/>
+            <pc:sldMk cId="3760719299" sldId="257"/>
+            <ac:spMk id="114" creationId="{00000000-0000-0000-0000-000000000000}"/>
+          </ac:spMkLst>
+        </pc:spChg>
+        <pc:spChg chg="del">
+          <ac:chgData name="Matthias Wiesenberger" userId="f1b754cb-c359-4b41-b165-8c08cbd0ddb4" providerId="ADAL" clId="{6C93FBF6-401F-430E-8C80-3465665F24FE}" dt="2025-03-25T14:35:46.148" v="10" actId="21"/>
+          <ac:spMkLst>
+            <pc:docMk/>
+            <pc:sldMk cId="3760719299" sldId="257"/>
+            <ac:spMk id="117" creationId="{00000000-0000-0000-0000-000000000000}"/>
+          </ac:spMkLst>
+        </pc:spChg>
+        <pc:spChg chg="mod">
+          <ac:chgData name="Matthias Wiesenberger" userId="f1b754cb-c359-4b41-b165-8c08cbd0ddb4" providerId="ADAL" clId="{6C93FBF6-401F-430E-8C80-3465665F24FE}" dt="2025-03-25T14:35:40.354" v="9"/>
+          <ac:spMkLst>
+            <pc:docMk/>
+            <pc:sldMk cId="3760719299" sldId="257"/>
+            <ac:spMk id="120" creationId="{00000000-0000-0000-0000-000000000000}"/>
+          </ac:spMkLst>
+        </pc:spChg>
+        <pc:spChg chg="add">
+          <ac:chgData name="Matthias Wiesenberger" userId="f1b754cb-c359-4b41-b165-8c08cbd0ddb4" providerId="ADAL" clId="{6C93FBF6-401F-430E-8C80-3465665F24FE}" dt="2025-03-25T14:36:38.555" v="11" actId="21"/>
+          <ac:spMkLst>
+            <pc:docMk/>
+            <pc:sldMk cId="3760719299" sldId="257"/>
+            <ac:spMk id="121" creationId="{00000000-0000-0000-0000-000000000000}"/>
+          </ac:spMkLst>
+        </pc:spChg>
+        <pc:spChg chg="add mod">
+          <ac:chgData name="Matthias Wiesenberger" userId="f1b754cb-c359-4b41-b165-8c08cbd0ddb4" providerId="ADAL" clId="{6C93FBF6-401F-430E-8C80-3465665F24FE}" dt="2025-03-25T14:35:40.354" v="9"/>
+          <ac:spMkLst>
+            <pc:docMk/>
+            <pc:sldMk cId="3760719299" sldId="257"/>
+            <ac:spMk id="122" creationId="{00000000-0000-0000-0000-000000000000}"/>
+          </ac:spMkLst>
+        </pc:spChg>
+        <pc:spChg chg="mod">
+          <ac:chgData name="Matthias Wiesenberger" userId="f1b754cb-c359-4b41-b165-8c08cbd0ddb4" providerId="ADAL" clId="{6C93FBF6-401F-430E-8C80-3465665F24FE}" dt="2025-03-25T14:35:40.354" v="9"/>
+          <ac:spMkLst>
+            <pc:docMk/>
+            <pc:sldMk cId="3760719299" sldId="257"/>
+            <ac:spMk id="138" creationId="{00000000-0000-0000-0000-000000000000}"/>
+          </ac:spMkLst>
+        </pc:spChg>
+        <pc:spChg chg="mod">
+          <ac:chgData name="Matthias Wiesenberger" userId="f1b754cb-c359-4b41-b165-8c08cbd0ddb4" providerId="ADAL" clId="{6C93FBF6-401F-430E-8C80-3465665F24FE}" dt="2025-03-25T14:35:40.354" v="9"/>
+          <ac:spMkLst>
+            <pc:docMk/>
+            <pc:sldMk cId="3760719299" sldId="257"/>
+            <ac:spMk id="145" creationId="{00000000-0000-0000-0000-000000000000}"/>
+          </ac:spMkLst>
+        </pc:spChg>
+        <pc:spChg chg="mod">
+          <ac:chgData name="Matthias Wiesenberger" userId="f1b754cb-c359-4b41-b165-8c08cbd0ddb4" providerId="ADAL" clId="{6C93FBF6-401F-430E-8C80-3465665F24FE}" dt="2025-03-25T14:35:40.354" v="9"/>
+          <ac:spMkLst>
+            <pc:docMk/>
+            <pc:sldMk cId="3760719299" sldId="257"/>
+            <ac:spMk id="146" creationId="{00000000-0000-0000-0000-000000000000}"/>
+          </ac:spMkLst>
+        </pc:spChg>
+        <pc:spChg chg="mod">
+          <ac:chgData name="Matthias Wiesenberger" userId="f1b754cb-c359-4b41-b165-8c08cbd0ddb4" providerId="ADAL" clId="{6C93FBF6-401F-430E-8C80-3465665F24FE}" dt="2025-03-25T14:35:40.354" v="9"/>
+          <ac:spMkLst>
+            <pc:docMk/>
+            <pc:sldMk cId="3760719299" sldId="257"/>
+            <ac:spMk id="149" creationId="{00000000-0000-0000-0000-000000000000}"/>
+          </ac:spMkLst>
+        </pc:spChg>
+        <pc:spChg chg="mod">
+          <ac:chgData name="Matthias Wiesenberger" userId="f1b754cb-c359-4b41-b165-8c08cbd0ddb4" providerId="ADAL" clId="{6C93FBF6-401F-430E-8C80-3465665F24FE}" dt="2025-03-25T14:35:40.354" v="9"/>
+          <ac:spMkLst>
+            <pc:docMk/>
+            <pc:sldMk cId="3760719299" sldId="257"/>
+            <ac:spMk id="152" creationId="{00000000-0000-0000-0000-000000000000}"/>
+          </ac:spMkLst>
+        </pc:spChg>
+        <pc:spChg chg="mod">
+          <ac:chgData name="Matthias Wiesenberger" userId="f1b754cb-c359-4b41-b165-8c08cbd0ddb4" providerId="ADAL" clId="{6C93FBF6-401F-430E-8C80-3465665F24FE}" dt="2025-03-25T14:35:40.354" v="9"/>
+          <ac:spMkLst>
+            <pc:docMk/>
+            <pc:sldMk cId="3760719299" sldId="257"/>
+            <ac:spMk id="153" creationId="{00000000-0000-0000-0000-000000000000}"/>
+          </ac:spMkLst>
+        </pc:spChg>
+      </pc:sldChg>
+    </pc:docChg>
+  </pc:docChgLst>
+</pc:chgInfo>
+</file>
+
 <file path=ppt/slideLayouts/slideLayout1.xml><?xml version="1.0" encoding="utf-8"?>
 <p:sldLayout xmlns:a="http://schemas.openxmlformats.org/drawingml/2006/main" xmlns:r="http://schemas.openxmlformats.org/officeDocument/2006/relationships" xmlns:p="http://schemas.openxmlformats.org/presentationml/2006/main" type="title" preserve="1">
   <p:cSld name="Title Slide">
@@ -165,7 +442,7 @@
           </a:lstStyle>
           <a:p>
             <a:r>
-              <a:rPr lang="en-US" smtClean="0"/>
+              <a:rPr lang="en-US"/>
               <a:t>Click to edit Master title style</a:t>
             </a:r>
             <a:endParaRPr lang="en-US" dirty="0"/>
@@ -230,7 +507,7 @@
           </a:lstStyle>
           <a:p>
             <a:r>
-              <a:rPr lang="en-US" smtClean="0"/>
+              <a:rPr lang="en-US"/>
               <a:t>Click to edit Master subtitle style</a:t>
             </a:r>
             <a:endParaRPr lang="en-US" dirty="0"/>
@@ -254,7 +531,7 @@
           <a:p>
             <a:fld id="{957A0BF8-18F9-4EE3-8444-B9D6551ED936}" type="datetimeFigureOut">
               <a:rPr lang="en-GB" smtClean="0"/>
-              <a:t>26/09/2023</a:t>
+              <a:t>25/03/2025</a:t>
             </a:fld>
             <a:endParaRPr lang="en-GB"/>
           </a:p>
@@ -348,7 +625,7 @@
           <a:lstStyle/>
           <a:p>
             <a:r>
-              <a:rPr lang="en-US" smtClean="0"/>
+              <a:rPr lang="en-US"/>
               <a:t>Click to edit Master title style</a:t>
             </a:r>
             <a:endParaRPr lang="en-US" dirty="0"/>
@@ -372,35 +649,35 @@
           <a:p>
             <a:pPr lvl="0"/>
             <a:r>
-              <a:rPr lang="en-US" smtClean="0"/>
+              <a:rPr lang="en-US"/>
               <a:t>Edit Master text styles</a:t>
             </a:r>
           </a:p>
           <a:p>
             <a:pPr lvl="1"/>
             <a:r>
-              <a:rPr lang="en-US" smtClean="0"/>
+              <a:rPr lang="en-US"/>
               <a:t>Second level</a:t>
             </a:r>
           </a:p>
           <a:p>
             <a:pPr lvl="2"/>
             <a:r>
-              <a:rPr lang="en-US" smtClean="0"/>
+              <a:rPr lang="en-US"/>
               <a:t>Third level</a:t>
             </a:r>
           </a:p>
           <a:p>
             <a:pPr lvl="3"/>
             <a:r>
-              <a:rPr lang="en-US" smtClean="0"/>
+              <a:rPr lang="en-US"/>
               <a:t>Fourth level</a:t>
             </a:r>
           </a:p>
           <a:p>
             <a:pPr lvl="4"/>
             <a:r>
-              <a:rPr lang="en-US" smtClean="0"/>
+              <a:rPr lang="en-US"/>
               <a:t>Fifth level</a:t>
             </a:r>
             <a:endParaRPr lang="en-US" dirty="0"/>
@@ -424,7 +701,7 @@
           <a:p>
             <a:fld id="{957A0BF8-18F9-4EE3-8444-B9D6551ED936}" type="datetimeFigureOut">
               <a:rPr lang="en-GB" smtClean="0"/>
-              <a:t>26/09/2023</a:t>
+              <a:t>25/03/2025</a:t>
             </a:fld>
             <a:endParaRPr lang="en-GB"/>
           </a:p>
@@ -523,7 +800,7 @@
           <a:lstStyle/>
           <a:p>
             <a:r>
-              <a:rPr lang="en-US" smtClean="0"/>
+              <a:rPr lang="en-US"/>
               <a:t>Click to edit Master title style</a:t>
             </a:r>
             <a:endParaRPr lang="en-US" dirty="0"/>
@@ -552,35 +829,35 @@
           <a:p>
             <a:pPr lvl="0"/>
             <a:r>
-              <a:rPr lang="en-US" smtClean="0"/>
+              <a:rPr lang="en-US"/>
               <a:t>Edit Master text styles</a:t>
             </a:r>
           </a:p>
           <a:p>
             <a:pPr lvl="1"/>
             <a:r>
-              <a:rPr lang="en-US" smtClean="0"/>
+              <a:rPr lang="en-US"/>
               <a:t>Second level</a:t>
             </a:r>
           </a:p>
           <a:p>
             <a:pPr lvl="2"/>
             <a:r>
-              <a:rPr lang="en-US" smtClean="0"/>
+              <a:rPr lang="en-US"/>
               <a:t>Third level</a:t>
             </a:r>
           </a:p>
           <a:p>
             <a:pPr lvl="3"/>
             <a:r>
-              <a:rPr lang="en-US" smtClean="0"/>
+              <a:rPr lang="en-US"/>
               <a:t>Fourth level</a:t>
             </a:r>
           </a:p>
           <a:p>
             <a:pPr lvl="4"/>
             <a:r>
-              <a:rPr lang="en-US" smtClean="0"/>
+              <a:rPr lang="en-US"/>
               <a:t>Fifth level</a:t>
             </a:r>
             <a:endParaRPr lang="en-US" dirty="0"/>
@@ -604,7 +881,7 @@
           <a:p>
             <a:fld id="{957A0BF8-18F9-4EE3-8444-B9D6551ED936}" type="datetimeFigureOut">
               <a:rPr lang="en-GB" smtClean="0"/>
-              <a:t>26/09/2023</a:t>
+              <a:t>25/03/2025</a:t>
             </a:fld>
             <a:endParaRPr lang="en-GB"/>
           </a:p>
@@ -698,7 +975,7 @@
           <a:lstStyle/>
           <a:p>
             <a:r>
-              <a:rPr lang="en-US" smtClean="0"/>
+              <a:rPr lang="en-US"/>
               <a:t>Click to edit Master title style</a:t>
             </a:r>
             <a:endParaRPr lang="en-US" dirty="0"/>
@@ -722,35 +999,35 @@
           <a:p>
             <a:pPr lvl="0"/>
             <a:r>
-              <a:rPr lang="en-US" smtClean="0"/>
+              <a:rPr lang="en-US"/>
               <a:t>Edit Master text styles</a:t>
             </a:r>
           </a:p>
           <a:p>
             <a:pPr lvl="1"/>
             <a:r>
-              <a:rPr lang="en-US" smtClean="0"/>
+              <a:rPr lang="en-US"/>
               <a:t>Second level</a:t>
             </a:r>
           </a:p>
           <a:p>
             <a:pPr lvl="2"/>
             <a:r>
-              <a:rPr lang="en-US" smtClean="0"/>
+              <a:rPr lang="en-US"/>
               <a:t>Third level</a:t>
             </a:r>
           </a:p>
           <a:p>
             <a:pPr lvl="3"/>
             <a:r>
-              <a:rPr lang="en-US" smtClean="0"/>
+              <a:rPr lang="en-US"/>
               <a:t>Fourth level</a:t>
             </a:r>
           </a:p>
           <a:p>
             <a:pPr lvl="4"/>
             <a:r>
-              <a:rPr lang="en-US" smtClean="0"/>
+              <a:rPr lang="en-US"/>
               <a:t>Fifth level</a:t>
             </a:r>
             <a:endParaRPr lang="en-US" dirty="0"/>
@@ -774,7 +1051,7 @@
           <a:p>
             <a:fld id="{957A0BF8-18F9-4EE3-8444-B9D6551ED936}" type="datetimeFigureOut">
               <a:rPr lang="en-GB" smtClean="0"/>
-              <a:t>26/09/2023</a:t>
+              <a:t>25/03/2025</a:t>
             </a:fld>
             <a:endParaRPr lang="en-GB"/>
           </a:p>
@@ -877,7 +1154,7 @@
           </a:lstStyle>
           <a:p>
             <a:r>
-              <a:rPr lang="en-US" smtClean="0"/>
+              <a:rPr lang="en-US"/>
               <a:t>Click to edit Master title style</a:t>
             </a:r>
             <a:endParaRPr lang="en-US" dirty="0"/>
@@ -997,7 +1274,7 @@
           <a:p>
             <a:pPr lvl="0"/>
             <a:r>
-              <a:rPr lang="en-US" smtClean="0"/>
+              <a:rPr lang="en-US"/>
               <a:t>Edit Master text styles</a:t>
             </a:r>
           </a:p>
@@ -1020,7 +1297,7 @@
           <a:p>
             <a:fld id="{957A0BF8-18F9-4EE3-8444-B9D6551ED936}" type="datetimeFigureOut">
               <a:rPr lang="en-GB" smtClean="0"/>
-              <a:t>26/09/2023</a:t>
+              <a:t>25/03/2025</a:t>
             </a:fld>
             <a:endParaRPr lang="en-GB"/>
           </a:p>
@@ -1114,7 +1391,7 @@
           <a:lstStyle/>
           <a:p>
             <a:r>
-              <a:rPr lang="en-US" smtClean="0"/>
+              <a:rPr lang="en-US"/>
               <a:t>Click to edit Master title style</a:t>
             </a:r>
             <a:endParaRPr lang="en-US" dirty="0"/>
@@ -1143,35 +1420,35 @@
           <a:p>
             <a:pPr lvl="0"/>
             <a:r>
-              <a:rPr lang="en-US" smtClean="0"/>
+              <a:rPr lang="en-US"/>
               <a:t>Edit Master text styles</a:t>
             </a:r>
           </a:p>
           <a:p>
             <a:pPr lvl="1"/>
             <a:r>
-              <a:rPr lang="en-US" smtClean="0"/>
+              <a:rPr lang="en-US"/>
               <a:t>Second level</a:t>
             </a:r>
           </a:p>
           <a:p>
             <a:pPr lvl="2"/>
             <a:r>
-              <a:rPr lang="en-US" smtClean="0"/>
+              <a:rPr lang="en-US"/>
               <a:t>Third level</a:t>
             </a:r>
           </a:p>
           <a:p>
             <a:pPr lvl="3"/>
             <a:r>
-              <a:rPr lang="en-US" smtClean="0"/>
+              <a:rPr lang="en-US"/>
               <a:t>Fourth level</a:t>
             </a:r>
           </a:p>
           <a:p>
             <a:pPr lvl="4"/>
             <a:r>
-              <a:rPr lang="en-US" smtClean="0"/>
+              <a:rPr lang="en-US"/>
               <a:t>Fifth level</a:t>
             </a:r>
             <a:endParaRPr lang="en-US" dirty="0"/>
@@ -1200,35 +1477,35 @@
           <a:p>
             <a:pPr lvl="0"/>
             <a:r>
-              <a:rPr lang="en-US" smtClean="0"/>
+              <a:rPr lang="en-US"/>
               <a:t>Edit Master text styles</a:t>
             </a:r>
           </a:p>
           <a:p>
             <a:pPr lvl="1"/>
             <a:r>
-              <a:rPr lang="en-US" smtClean="0"/>
+              <a:rPr lang="en-US"/>
               <a:t>Second level</a:t>
             </a:r>
           </a:p>
           <a:p>
             <a:pPr lvl="2"/>
             <a:r>
-              <a:rPr lang="en-US" smtClean="0"/>
+              <a:rPr lang="en-US"/>
               <a:t>Third level</a:t>
             </a:r>
           </a:p>
           <a:p>
             <a:pPr lvl="3"/>
             <a:r>
-              <a:rPr lang="en-US" smtClean="0"/>
+              <a:rPr lang="en-US"/>
               <a:t>Fourth level</a:t>
             </a:r>
           </a:p>
           <a:p>
             <a:pPr lvl="4"/>
             <a:r>
-              <a:rPr lang="en-US" smtClean="0"/>
+              <a:rPr lang="en-US"/>
               <a:t>Fifth level</a:t>
             </a:r>
             <a:endParaRPr lang="en-US" dirty="0"/>
@@ -1252,7 +1529,7 @@
           <a:p>
             <a:fld id="{957A0BF8-18F9-4EE3-8444-B9D6551ED936}" type="datetimeFigureOut">
               <a:rPr lang="en-GB" smtClean="0"/>
-              <a:t>26/09/2023</a:t>
+              <a:t>25/03/2025</a:t>
             </a:fld>
             <a:endParaRPr lang="en-GB"/>
           </a:p>
@@ -1351,7 +1628,7 @@
           <a:lstStyle/>
           <a:p>
             <a:r>
-              <a:rPr lang="en-US" smtClean="0"/>
+              <a:rPr lang="en-US"/>
               <a:t>Click to edit Master title style</a:t>
             </a:r>
             <a:endParaRPr lang="en-US" dirty="0"/>
@@ -1417,7 +1694,7 @@
           <a:p>
             <a:pPr lvl="0"/>
             <a:r>
-              <a:rPr lang="en-US" smtClean="0"/>
+              <a:rPr lang="en-US"/>
               <a:t>Edit Master text styles</a:t>
             </a:r>
           </a:p>
@@ -1445,35 +1722,35 @@
           <a:p>
             <a:pPr lvl="0"/>
             <a:r>
-              <a:rPr lang="en-US" smtClean="0"/>
+              <a:rPr lang="en-US"/>
               <a:t>Edit Master text styles</a:t>
             </a:r>
           </a:p>
           <a:p>
             <a:pPr lvl="1"/>
             <a:r>
-              <a:rPr lang="en-US" smtClean="0"/>
+              <a:rPr lang="en-US"/>
               <a:t>Second level</a:t>
             </a:r>
           </a:p>
           <a:p>
             <a:pPr lvl="2"/>
             <a:r>
-              <a:rPr lang="en-US" smtClean="0"/>
+              <a:rPr lang="en-US"/>
               <a:t>Third level</a:t>
             </a:r>
           </a:p>
           <a:p>
             <a:pPr lvl="3"/>
             <a:r>
-              <a:rPr lang="en-US" smtClean="0"/>
+              <a:rPr lang="en-US"/>
               <a:t>Fourth level</a:t>
             </a:r>
           </a:p>
           <a:p>
             <a:pPr lvl="4"/>
             <a:r>
-              <a:rPr lang="en-US" smtClean="0"/>
+              <a:rPr lang="en-US"/>
               <a:t>Fifth level</a:t>
             </a:r>
             <a:endParaRPr lang="en-US" dirty="0"/>
@@ -1539,7 +1816,7 @@
           <a:p>
             <a:pPr lvl="0"/>
             <a:r>
-              <a:rPr lang="en-US" smtClean="0"/>
+              <a:rPr lang="en-US"/>
               <a:t>Edit Master text styles</a:t>
             </a:r>
           </a:p>
@@ -1567,35 +1844,35 @@
           <a:p>
             <a:pPr lvl="0"/>
             <a:r>
-              <a:rPr lang="en-US" smtClean="0"/>
+              <a:rPr lang="en-US"/>
               <a:t>Edit Master text styles</a:t>
             </a:r>
           </a:p>
           <a:p>
             <a:pPr lvl="1"/>
             <a:r>
-              <a:rPr lang="en-US" smtClean="0"/>
+              <a:rPr lang="en-US"/>
               <a:t>Second level</a:t>
             </a:r>
           </a:p>
           <a:p>
             <a:pPr lvl="2"/>
             <a:r>
-              <a:rPr lang="en-US" smtClean="0"/>
+              <a:rPr lang="en-US"/>
               <a:t>Third level</a:t>
             </a:r>
           </a:p>
           <a:p>
             <a:pPr lvl="3"/>
             <a:r>
-              <a:rPr lang="en-US" smtClean="0"/>
+              <a:rPr lang="en-US"/>
               <a:t>Fourth level</a:t>
             </a:r>
           </a:p>
           <a:p>
             <a:pPr lvl="4"/>
             <a:r>
-              <a:rPr lang="en-US" smtClean="0"/>
+              <a:rPr lang="en-US"/>
               <a:t>Fifth level</a:t>
             </a:r>
             <a:endParaRPr lang="en-US" dirty="0"/>
@@ -1619,7 +1896,7 @@
           <a:p>
             <a:fld id="{957A0BF8-18F9-4EE3-8444-B9D6551ED936}" type="datetimeFigureOut">
               <a:rPr lang="en-GB" smtClean="0"/>
-              <a:t>26/09/2023</a:t>
+              <a:t>25/03/2025</a:t>
             </a:fld>
             <a:endParaRPr lang="en-GB"/>
           </a:p>
@@ -1713,7 +1990,7 @@
           <a:lstStyle/>
           <a:p>
             <a:r>
-              <a:rPr lang="en-US" smtClean="0"/>
+              <a:rPr lang="en-US"/>
               <a:t>Click to edit Master title style</a:t>
             </a:r>
             <a:endParaRPr lang="en-US" dirty="0"/>
@@ -1737,7 +2014,7 @@
           <a:p>
             <a:fld id="{957A0BF8-18F9-4EE3-8444-B9D6551ED936}" type="datetimeFigureOut">
               <a:rPr lang="en-GB" smtClean="0"/>
-              <a:t>26/09/2023</a:t>
+              <a:t>25/03/2025</a:t>
             </a:fld>
             <a:endParaRPr lang="en-GB"/>
           </a:p>
@@ -1832,7 +2109,7 @@
           <a:p>
             <a:fld id="{957A0BF8-18F9-4EE3-8444-B9D6551ED936}" type="datetimeFigureOut">
               <a:rPr lang="en-GB" smtClean="0"/>
-              <a:t>26/09/2023</a:t>
+              <a:t>25/03/2025</a:t>
             </a:fld>
             <a:endParaRPr lang="en-GB"/>
           </a:p>
@@ -1935,7 +2212,7 @@
           </a:lstStyle>
           <a:p>
             <a:r>
-              <a:rPr lang="en-US" smtClean="0"/>
+              <a:rPr lang="en-US"/>
               <a:t>Click to edit Master title style</a:t>
             </a:r>
             <a:endParaRPr lang="en-US" dirty="0"/>
@@ -1992,35 +2269,35 @@
           <a:p>
             <a:pPr lvl="0"/>
             <a:r>
-              <a:rPr lang="en-US" smtClean="0"/>
+              <a:rPr lang="en-US"/>
               <a:t>Edit Master text styles</a:t>
             </a:r>
           </a:p>
           <a:p>
             <a:pPr lvl="1"/>
             <a:r>
-              <a:rPr lang="en-US" smtClean="0"/>
+              <a:rPr lang="en-US"/>
               <a:t>Second level</a:t>
             </a:r>
           </a:p>
           <a:p>
             <a:pPr lvl="2"/>
             <a:r>
-              <a:rPr lang="en-US" smtClean="0"/>
+              <a:rPr lang="en-US"/>
               <a:t>Third level</a:t>
             </a:r>
           </a:p>
           <a:p>
             <a:pPr lvl="3"/>
             <a:r>
-              <a:rPr lang="en-US" smtClean="0"/>
+              <a:rPr lang="en-US"/>
               <a:t>Fourth level</a:t>
             </a:r>
           </a:p>
           <a:p>
             <a:pPr lvl="4"/>
             <a:r>
-              <a:rPr lang="en-US" smtClean="0"/>
+              <a:rPr lang="en-US"/>
               <a:t>Fifth level</a:t>
             </a:r>
             <a:endParaRPr lang="en-US" dirty="0"/>
@@ -2086,7 +2363,7 @@
           <a:p>
             <a:pPr lvl="0"/>
             <a:r>
-              <a:rPr lang="en-US" smtClean="0"/>
+              <a:rPr lang="en-US"/>
               <a:t>Edit Master text styles</a:t>
             </a:r>
           </a:p>
@@ -2109,7 +2386,7 @@
           <a:p>
             <a:fld id="{957A0BF8-18F9-4EE3-8444-B9D6551ED936}" type="datetimeFigureOut">
               <a:rPr lang="en-GB" smtClean="0"/>
-              <a:t>26/09/2023</a:t>
+              <a:t>25/03/2025</a:t>
             </a:fld>
             <a:endParaRPr lang="en-GB"/>
           </a:p>
@@ -2212,7 +2489,7 @@
           </a:lstStyle>
           <a:p>
             <a:r>
-              <a:rPr lang="en-US" smtClean="0"/>
+              <a:rPr lang="en-US"/>
               <a:t>Click to edit Master title style</a:t>
             </a:r>
             <a:endParaRPr lang="en-US" dirty="0"/>
@@ -2277,7 +2554,7 @@
           </a:lstStyle>
           <a:p>
             <a:r>
-              <a:rPr lang="en-US" smtClean="0"/>
+              <a:rPr lang="en-US"/>
               <a:t>Click icon to add picture</a:t>
             </a:r>
             <a:endParaRPr lang="en-US" dirty="0"/>
@@ -2343,7 +2620,7 @@
           <a:p>
             <a:pPr lvl="0"/>
             <a:r>
-              <a:rPr lang="en-US" smtClean="0"/>
+              <a:rPr lang="en-US"/>
               <a:t>Edit Master text styles</a:t>
             </a:r>
           </a:p>
@@ -2366,7 +2643,7 @@
           <a:p>
             <a:fld id="{957A0BF8-18F9-4EE3-8444-B9D6551ED936}" type="datetimeFigureOut">
               <a:rPr lang="en-GB" smtClean="0"/>
-              <a:t>26/09/2023</a:t>
+              <a:t>25/03/2025</a:t>
             </a:fld>
             <a:endParaRPr lang="en-GB"/>
           </a:p>
@@ -2475,7 +2752,7 @@
           <a:lstStyle/>
           <a:p>
             <a:r>
-              <a:rPr lang="en-US" smtClean="0"/>
+              <a:rPr lang="en-US"/>
               <a:t>Click to edit Master title style</a:t>
             </a:r>
             <a:endParaRPr lang="en-US" dirty="0"/>
@@ -2509,35 +2786,35 @@
           <a:p>
             <a:pPr lvl="0"/>
             <a:r>
-              <a:rPr lang="en-US" smtClean="0"/>
+              <a:rPr lang="en-US"/>
               <a:t>Edit Master text styles</a:t>
             </a:r>
           </a:p>
           <a:p>
             <a:pPr lvl="1"/>
             <a:r>
-              <a:rPr lang="en-US" smtClean="0"/>
+              <a:rPr lang="en-US"/>
               <a:t>Second level</a:t>
             </a:r>
           </a:p>
           <a:p>
             <a:pPr lvl="2"/>
             <a:r>
-              <a:rPr lang="en-US" smtClean="0"/>
+              <a:rPr lang="en-US"/>
               <a:t>Third level</a:t>
             </a:r>
           </a:p>
           <a:p>
             <a:pPr lvl="3"/>
             <a:r>
-              <a:rPr lang="en-US" smtClean="0"/>
+              <a:rPr lang="en-US"/>
               <a:t>Fourth level</a:t>
             </a:r>
           </a:p>
           <a:p>
             <a:pPr lvl="4"/>
             <a:r>
-              <a:rPr lang="en-US" smtClean="0"/>
+              <a:rPr lang="en-US"/>
               <a:t>Fifth level</a:t>
             </a:r>
             <a:endParaRPr lang="en-US" dirty="0"/>
@@ -2579,7 +2856,7 @@
           <a:p>
             <a:fld id="{957A0BF8-18F9-4EE3-8444-B9D6551ED936}" type="datetimeFigureOut">
               <a:rPr lang="en-GB" smtClean="0"/>
-              <a:t>26/09/2023</a:t>
+              <a:t>25/03/2025</a:t>
             </a:fld>
             <a:endParaRPr lang="en-GB"/>
           </a:p>
@@ -3277,7 +3554,7 @@
             <a:pPr algn="ctr"/>
             <a:r>
               <a:rPr lang="en-GB" sz="1956" dirty="0" err="1"/>
-              <a:t>cusplibrary</a:t>
+              <a:t>cusparse</a:t>
             </a:r>
             <a:endParaRPr lang="en-GB" sz="1956" dirty="0"/>
           </a:p>
@@ -3964,7 +4241,7 @@
           <a:p>
             <a:pPr algn="ctr"/>
             <a:r>
-              <a:rPr lang="en-US" sz="2133" b="1" dirty="0" smtClean="0">
+              <a:rPr lang="en-US" sz="2133" b="1" dirty="0">
                 <a:solidFill>
                   <a:prstClr val="white"/>
                 </a:solidFill>
@@ -4002,20 +4279,12 @@
           <a:p>
             <a:pPr algn="ctr"/>
             <a:r>
-              <a:rPr lang="en-GB" sz="2133" b="1" dirty="0" smtClean="0">
-                <a:solidFill>
-                  <a:prstClr val="white"/>
-                </a:solidFill>
-              </a:rPr>
-              <a:t>Application </a:t>
-            </a:r>
-            <a:r>
               <a:rPr lang="en-GB" sz="2133" b="1" dirty="0">
                 <a:solidFill>
                   <a:prstClr val="white"/>
                 </a:solidFill>
               </a:rPr>
-              <a:t>codes</a:t>
+              <a:t>Application codes</a:t>
             </a:r>
           </a:p>
         </p:txBody>
@@ -4503,34 +4772,13 @@
           <a:p>
             <a:pPr algn="ctr"/>
             <a:r>
-              <a:rPr lang="en-GB" sz="2133" dirty="0" smtClean="0">
-                <a:solidFill>
-                  <a:prstClr val="white"/>
-                </a:solidFill>
-              </a:rPr>
-              <a:t>Advanced </a:t>
-            </a:r>
-            <a:r>
               <a:rPr lang="en-GB" sz="2133" dirty="0">
                 <a:solidFill>
                   <a:prstClr val="white"/>
                 </a:solidFill>
               </a:rPr>
-              <a:t>numerical </a:t>
-            </a:r>
-            <a:r>
-              <a:rPr lang="en-GB" sz="2133" dirty="0" smtClean="0">
-                <a:solidFill>
-                  <a:prstClr val="white"/>
-                </a:solidFill>
-              </a:rPr>
-              <a:t>algorithms</a:t>
-            </a:r>
-            <a:endParaRPr lang="en-GB" sz="2133" dirty="0">
-              <a:solidFill>
-                <a:prstClr val="white"/>
-              </a:solidFill>
-            </a:endParaRPr>
+              <a:t>Advanced numerical algorithms</a:t>
+            </a:r>
           </a:p>
         </p:txBody>
       </p:sp>
@@ -4645,26 +4893,25 @@
           <a:lstStyle/>
           <a:p>
             <a:pPr algn="ctr"/>
-            <a:endParaRPr lang="en-GB" sz="1956" dirty="0" smtClean="0"/>
+            <a:endParaRPr lang="en-GB" sz="1956" dirty="0"/>
           </a:p>
           <a:p>
             <a:pPr algn="ctr"/>
             <a:r>
-              <a:rPr lang="en-GB" sz="1956" dirty="0" err="1" smtClean="0"/>
+              <a:rPr lang="en-GB" sz="1956" dirty="0" err="1"/>
               <a:t>netcdf</a:t>
             </a:r>
             <a:r>
-              <a:rPr lang="en-GB" sz="1956" dirty="0" smtClean="0"/>
+              <a:rPr lang="en-GB" sz="1956" dirty="0"/>
               <a:t> </a:t>
             </a:r>
           </a:p>
           <a:p>
             <a:pPr algn="ctr"/>
             <a:r>
-              <a:rPr lang="en-GB" sz="1956" dirty="0" smtClean="0"/>
+              <a:rPr lang="en-GB" sz="1956" dirty="0"/>
               <a:t>utilities</a:t>
             </a:r>
-            <a:endParaRPr lang="en-GB" sz="1956" dirty="0"/>
           </a:p>
           <a:p>
             <a:pPr algn="ctr"/>
@@ -4723,21 +4970,17 @@
           <a:lstStyle/>
           <a:p>
             <a:pPr algn="ctr"/>
-            <a:endParaRPr lang="en-GB" sz="1956" dirty="0" smtClean="0"/>
+            <a:endParaRPr lang="en-GB" sz="1956" dirty="0"/>
           </a:p>
           <a:p>
             <a:pPr algn="ctr"/>
             <a:r>
-              <a:rPr lang="en-GB" sz="1956" dirty="0" err="1" smtClean="0"/>
+              <a:rPr lang="en-GB" sz="1956" dirty="0" err="1"/>
               <a:t>jsoncpp</a:t>
             </a:r>
             <a:r>
-              <a:rPr lang="en-GB" sz="1956" dirty="0" smtClean="0"/>
-              <a:t> </a:t>
-            </a:r>
-            <a:r>
               <a:rPr lang="en-GB" sz="1956" dirty="0"/>
-              <a:t>utilities</a:t>
+              <a:t> utilities</a:t>
             </a:r>
           </a:p>
           <a:p>
@@ -4769,20 +5012,12 @@
           <a:p>
             <a:pPr algn="ctr"/>
             <a:r>
-              <a:rPr lang="en-GB" sz="2133" dirty="0" smtClean="0">
-                <a:solidFill>
-                  <a:prstClr val="white"/>
-                </a:solidFill>
-              </a:rPr>
-              <a:t>File </a:t>
-            </a:r>
-            <a:r>
               <a:rPr lang="en-GB" sz="2133" dirty="0">
                 <a:solidFill>
                   <a:prstClr val="white"/>
                 </a:solidFill>
               </a:rPr>
-              <a:t>I/O operations</a:t>
+              <a:t>File I/O operations</a:t>
             </a:r>
           </a:p>
         </p:txBody>
@@ -5059,18 +5294,13 @@
           <a:p>
             <a:pPr algn="ctr"/>
             <a:r>
-              <a:rPr lang="en-GB" sz="2133" dirty="0" smtClean="0">
+              <a:rPr lang="en-GB" sz="2133" dirty="0">
                 <a:solidFill>
                   <a:prstClr val="white"/>
                 </a:solidFill>
               </a:rPr>
               <a:t>Geometries extension</a:t>
             </a:r>
-            <a:endParaRPr lang="en-GB" sz="2133" dirty="0">
-              <a:solidFill>
-                <a:prstClr val="white"/>
-              </a:solidFill>
-            </a:endParaRPr>
           </a:p>
         </p:txBody>
       </p:sp>
@@ -5203,23 +5433,7 @@
               <a:pPr algn="ctr"/>
               <a:r>
                 <a:rPr lang="en-GB" sz="1956" dirty="0"/>
-                <a:t>E</a:t>
-              </a:r>
-              <a:r>
-                <a:rPr lang="en-GB" sz="1956" dirty="0" smtClean="0"/>
-                <a:t>xplicit </a:t>
-              </a:r>
-              <a:r>
-                <a:rPr lang="en-GB" sz="1956" dirty="0"/>
-                <a:t>and I</a:t>
-              </a:r>
-              <a:r>
-                <a:rPr lang="en-GB" sz="1956" dirty="0" smtClean="0"/>
-                <a:t>mplicit </a:t>
-              </a:r>
-              <a:r>
-                <a:rPr lang="en-GB" sz="1956" dirty="0"/>
-                <a:t>ODE integrators</a:t>
+                <a:t>Explicit and Implicit ODE integrators</a:t>
               </a:r>
             </a:p>
           </p:txBody>
@@ -5306,34 +5520,13 @@
           <a:p>
             <a:pPr algn="ctr"/>
             <a:r>
-              <a:rPr lang="en-GB" sz="2133" dirty="0" smtClean="0">
-                <a:solidFill>
-                  <a:prstClr val="white"/>
-                </a:solidFill>
-              </a:rPr>
-              <a:t>Basic </a:t>
-            </a:r>
-            <a:r>
               <a:rPr lang="en-GB" sz="2133" dirty="0">
                 <a:solidFill>
                   <a:prstClr val="white"/>
                 </a:solidFill>
               </a:rPr>
-              <a:t>numerical </a:t>
-            </a:r>
-            <a:r>
-              <a:rPr lang="en-GB" sz="2133" dirty="0" smtClean="0">
-                <a:solidFill>
-                  <a:prstClr val="white"/>
-                </a:solidFill>
-              </a:rPr>
-              <a:t>algorithms</a:t>
-            </a:r>
-            <a:endParaRPr lang="en-GB" sz="2133" dirty="0">
-              <a:solidFill>
-                <a:prstClr val="white"/>
-              </a:solidFill>
-            </a:endParaRPr>
+              <a:t>Basic numerical algorithms</a:t>
+            </a:r>
           </a:p>
         </p:txBody>
       </p:sp>
@@ -5760,20 +5953,12 @@
           <a:p>
             <a:pPr algn="ctr"/>
             <a:r>
-              <a:rPr lang="en-GB" sz="2133" dirty="0" smtClean="0">
-                <a:solidFill>
-                  <a:prstClr val="white"/>
-                </a:solidFill>
-              </a:rPr>
-              <a:t>Basic </a:t>
-            </a:r>
-            <a:r>
               <a:rPr lang="en-GB" sz="2133" dirty="0">
                 <a:solidFill>
                   <a:prstClr val="white"/>
                 </a:solidFill>
               </a:rPr>
-              <a:t>parallel operations</a:t>
+              <a:t>Basic parallel operations</a:t>
             </a:r>
           </a:p>
         </p:txBody>
@@ -5931,17 +6116,12 @@
                   <a:rPr lang="en-GB" sz="1956" dirty="0"/>
                   <a:t> </a:t>
                 </a:r>
-                <a:endParaRPr lang="en-GB" sz="1956" dirty="0" smtClean="0"/>
               </a:p>
               <a:p>
                 <a:pPr algn="ctr"/>
                 <a:r>
-                  <a:rPr lang="en-GB" sz="1956" dirty="0" smtClean="0"/>
-                  <a:t>Topology </a:t>
-                </a:r>
-                <a:r>
                   <a:rPr lang="en-GB" sz="1956" dirty="0"/>
-                  <a:t>1d, 2d, 3d</a:t>
+                  <a:t>Topology 1d, 2d, 3d</a:t>
                 </a:r>
               </a:p>
             </p:txBody>
@@ -6178,18 +6358,13 @@
           <a:p>
             <a:pPr algn="ctr"/>
             <a:r>
-              <a:rPr lang="en-GB" sz="2800" b="1" dirty="0" smtClean="0">
+              <a:rPr lang="en-GB" sz="2800" b="1" dirty="0">
                 <a:solidFill>
                   <a:prstClr val="white"/>
                 </a:solidFill>
               </a:rPr>
               <a:t>FELTOR</a:t>
             </a:r>
-            <a:endParaRPr lang="en-GB" sz="2800" b="1" dirty="0">
-              <a:solidFill>
-                <a:prstClr val="white"/>
-              </a:solidFill>
-            </a:endParaRPr>
           </a:p>
         </p:txBody>
       </p:sp>
@@ -6245,7 +6420,7 @@
           <a:p>
             <a:pPr algn="ctr"/>
             <a:r>
-              <a:rPr lang="en-GB" sz="1956" dirty="0" err="1" smtClean="0"/>
+              <a:rPr lang="en-GB" sz="1956" dirty="0" err="1"/>
               <a:t>vcl</a:t>
             </a:r>
             <a:endParaRPr lang="en-GB" sz="1956" dirty="0"/>
@@ -6460,18 +6635,13 @@
             <a:lstStyle/>
             <a:p>
               <a:r>
-                <a:rPr lang="en-GB" dirty="0" smtClean="0">
+                <a:rPr lang="en-GB" dirty="0">
                   <a:solidFill>
                     <a:schemeClr val="bg1"/>
                   </a:solidFill>
                 </a:rPr>
                 <a:t>External library </a:t>
               </a:r>
-              <a:endParaRPr lang="en-GB" dirty="0">
-                <a:solidFill>
-                  <a:schemeClr val="bg1"/>
-                </a:solidFill>
-              </a:endParaRPr>
             </a:p>
           </p:txBody>
         </p:sp>
@@ -6498,18 +6668,13 @@
             <a:lstStyle/>
             <a:p>
               <a:r>
-                <a:rPr lang="en-GB" dirty="0" smtClean="0">
+                <a:rPr lang="en-GB" dirty="0">
                   <a:solidFill>
                     <a:schemeClr val="bg1"/>
                   </a:solidFill>
                 </a:rPr>
                 <a:t>Submodule</a:t>
               </a:r>
-              <a:endParaRPr lang="en-GB" dirty="0">
-                <a:solidFill>
-                  <a:schemeClr val="bg1"/>
-                </a:solidFill>
-              </a:endParaRPr>
             </a:p>
           </p:txBody>
         </p:sp>
@@ -6653,7 +6818,7 @@
             <a:lstStyle/>
             <a:p>
               <a:r>
-                <a:rPr lang="en-US" dirty="0" smtClean="0">
+                <a:rPr lang="en-US" dirty="0">
                   <a:solidFill>
                     <a:schemeClr val="bg1"/>
                   </a:solidFill>
@@ -6691,7 +6856,7 @@
             <a:lstStyle/>
             <a:p>
               <a:r>
-                <a:rPr lang="en-US" dirty="0" smtClean="0">
+                <a:rPr lang="en-US" dirty="0">
                   <a:solidFill>
                     <a:schemeClr val="bg1"/>
                   </a:solidFill>
@@ -6789,18 +6954,13 @@
             <a:lstStyle/>
             <a:p>
               <a:r>
-                <a:rPr lang="en-GB" dirty="0" smtClean="0">
+                <a:rPr lang="en-GB" dirty="0">
                   <a:solidFill>
                     <a:schemeClr val="bg1"/>
                   </a:solidFill>
                 </a:rPr>
                 <a:t>Extension</a:t>
               </a:r>
-              <a:endParaRPr lang="en-GB" dirty="0">
-                <a:solidFill>
-                  <a:schemeClr val="bg1"/>
-                </a:solidFill>
-              </a:endParaRPr>
             </a:p>
           </p:txBody>
         </p:sp>
@@ -6815,13 +6975,6 @@
   <p:clrMapOvr>
     <a:masterClrMapping/>
   </p:clrMapOvr>
-  <p:timing>
-    <p:tnLst>
-      <p:par>
-        <p:cTn id="1" dur="indefinite" restart="never" nodeType="tmRoot"/>
-      </p:par>
-    </p:tnLst>
-  </p:timing>
 </p:sld>
 </file>
 

</xml_diff>